<commit_message>
modify project presentation slides
</commit_message>
<xml_diff>
--- a/IOT 360 Project Update.pptx
+++ b/IOT 360 Project Update.pptx
@@ -8,14 +8,16 @@
     <p:sldId id="256" r:id="rId2"/>
     <p:sldId id="266" r:id="rId3"/>
     <p:sldId id="260" r:id="rId4"/>
-    <p:sldId id="261" r:id="rId5"/>
-    <p:sldId id="257" r:id="rId6"/>
+    <p:sldId id="267" r:id="rId5"/>
+    <p:sldId id="261" r:id="rId6"/>
     <p:sldId id="264" r:id="rId7"/>
     <p:sldId id="263" r:id="rId8"/>
     <p:sldId id="262" r:id="rId9"/>
-    <p:sldId id="258" r:id="rId10"/>
-    <p:sldId id="265" r:id="rId11"/>
-    <p:sldId id="259" r:id="rId12"/>
+    <p:sldId id="257" r:id="rId10"/>
+    <p:sldId id="258" r:id="rId11"/>
+    <p:sldId id="265" r:id="rId12"/>
+    <p:sldId id="268" r:id="rId13"/>
+    <p:sldId id="259" r:id="rId14"/>
   </p:sldIdLst>
   <p:sldSz cx="12192000" cy="6858000"/>
   <p:notesSz cx="6858000" cy="9144000"/>
@@ -3119,7 +3121,7 @@
           <p:cNvPr id="2" name="Title 1">
             <a:extLst>
               <a:ext uri="{FF2B5EF4-FFF2-40B4-BE49-F238E27FC236}">
-                <a16:creationId xmlns:a16="http://schemas.microsoft.com/office/drawing/2014/main" id="{417E475F-C786-4F8E-8662-396DE6B34F49}"/>
+                <a16:creationId xmlns:a16="http://schemas.microsoft.com/office/drawing/2014/main" id="{0632F8DB-8B94-4260-9E4E-5CF1EF725CE5}"/>
               </a:ext>
             </a:extLst>
           </p:cNvPr>
@@ -3130,14 +3132,19 @@
             <p:ph type="title"/>
           </p:nvPr>
         </p:nvSpPr>
-        <p:spPr/>
+        <p:spPr>
+          <a:xfrm>
+            <a:off x="838199" y="365126"/>
+            <a:ext cx="7363407" cy="1155764"/>
+          </a:xfrm>
+        </p:spPr>
         <p:txBody>
           <a:bodyPr/>
           <a:lstStyle/>
           <a:p>
             <a:r>
               <a:rPr lang="en-US" dirty="0"/>
-              <a:t>What’s Next</a:t>
+              <a:t>A Sample Email</a:t>
             </a:r>
           </a:p>
         </p:txBody>
@@ -3147,7 +3154,7 @@
           <p:cNvPr id="3" name="Content Placeholder 2">
             <a:extLst>
               <a:ext uri="{FF2B5EF4-FFF2-40B4-BE49-F238E27FC236}">
-                <a16:creationId xmlns:a16="http://schemas.microsoft.com/office/drawing/2014/main" id="{C025FCF3-57C7-4DCB-8CE3-95BC593B4E8E}"/>
+                <a16:creationId xmlns:a16="http://schemas.microsoft.com/office/drawing/2014/main" id="{D235339B-EA88-421D-A526-A0DDA017C6AC}"/>
               </a:ext>
             </a:extLst>
           </p:cNvPr>
@@ -3158,60 +3165,54 @@
             <p:ph idx="1"/>
           </p:nvPr>
         </p:nvSpPr>
-        <p:spPr/>
-        <p:txBody>
-          <a:bodyPr/>
-          <a:lstStyle/>
-          <a:p>
-            <a:r>
-              <a:rPr lang="en-US" dirty="0"/>
-              <a:t>Limitation:</a:t>
-            </a:r>
-          </a:p>
-          <a:p>
-            <a:pPr lvl="1"/>
-            <a:r>
-              <a:rPr lang="en-US" dirty="0"/>
-              <a:t>Accuracy on motion detection, hard to decide a proper trigger time</a:t>
-            </a:r>
-          </a:p>
-          <a:p>
-            <a:pPr lvl="1"/>
-            <a:r>
-              <a:rPr lang="en-US" dirty="0"/>
-              <a:t>Audio Connection – No headphone jack on RPi Zero, need to seek a budget friendly way to play sound.</a:t>
-            </a:r>
-          </a:p>
-          <a:p>
-            <a:pPr lvl="1"/>
+        <p:spPr>
+          <a:xfrm>
+            <a:off x="838200" y="1825625"/>
+            <a:ext cx="7363408" cy="4667250"/>
+          </a:xfrm>
+        </p:spPr>
+        <p:txBody>
+          <a:bodyPr/>
+          <a:lstStyle/>
+          <a:p>
             <a:endParaRPr lang="en-US" dirty="0"/>
           </a:p>
-          <a:p>
-            <a:r>
-              <a:rPr lang="en-US" dirty="0"/>
-              <a:t>Future Work:</a:t>
-            </a:r>
-          </a:p>
-          <a:p>
-            <a:pPr lvl="1"/>
-            <a:r>
-              <a:rPr lang="en-US" dirty="0"/>
-              <a:t>Automatically start &amp; run on each re/boot</a:t>
-            </a:r>
-          </a:p>
-          <a:p>
-            <a:pPr lvl="1"/>
-            <a:r>
-              <a:rPr lang="en-US" dirty="0"/>
-              <a:t>A front-end website for checking status</a:t>
-            </a:r>
-          </a:p>
-        </p:txBody>
-      </p:sp>
+        </p:txBody>
+      </p:sp>
+      <p:pic>
+        <p:nvPicPr>
+          <p:cNvPr id="5" name="Picture 4">
+            <a:extLst>
+              <a:ext uri="{FF2B5EF4-FFF2-40B4-BE49-F238E27FC236}">
+                <a16:creationId xmlns:a16="http://schemas.microsoft.com/office/drawing/2014/main" id="{21ABA21F-019F-45D4-81E5-C21FBAEA42D3}"/>
+              </a:ext>
+            </a:extLst>
+          </p:cNvPr>
+          <p:cNvPicPr>
+            <a:picLocks noChangeAspect="1"/>
+          </p:cNvPicPr>
+          <p:nvPr/>
+        </p:nvPicPr>
+        <p:blipFill>
+          <a:blip r:embed="rId2"/>
+          <a:stretch>
+            <a:fillRect/>
+          </a:stretch>
+        </p:blipFill>
+        <p:spPr>
+          <a:xfrm>
+            <a:off x="8334818" y="197745"/>
+            <a:ext cx="3018982" cy="6462509"/>
+          </a:xfrm>
+          <a:prstGeom prst="rect">
+            <a:avLst/>
+          </a:prstGeom>
+        </p:spPr>
+      </p:pic>
     </p:spTree>
     <p:extLst>
       <p:ext uri="{BB962C8B-B14F-4D97-AF65-F5344CB8AC3E}">
-        <p14:creationId xmlns:p14="http://schemas.microsoft.com/office/powerpoint/2010/main" val="2912744063"/>
+        <p14:creationId xmlns:p14="http://schemas.microsoft.com/office/powerpoint/2010/main" val="4290429151"/>
       </p:ext>
     </p:extLst>
   </p:cSld>
@@ -3243,6 +3244,223 @@
           <p:cNvPr id="2" name="Title 1">
             <a:extLst>
               <a:ext uri="{FF2B5EF4-FFF2-40B4-BE49-F238E27FC236}">
+                <a16:creationId xmlns:a16="http://schemas.microsoft.com/office/drawing/2014/main" id="{417E475F-C786-4F8E-8662-396DE6B34F49}"/>
+              </a:ext>
+            </a:extLst>
+          </p:cNvPr>
+          <p:cNvSpPr>
+            <a:spLocks noGrp="1"/>
+          </p:cNvSpPr>
+          <p:nvPr>
+            <p:ph type="title"/>
+          </p:nvPr>
+        </p:nvSpPr>
+        <p:spPr/>
+        <p:txBody>
+          <a:bodyPr/>
+          <a:lstStyle/>
+          <a:p>
+            <a:r>
+              <a:rPr lang="en-US" dirty="0"/>
+              <a:t>What’s Next</a:t>
+            </a:r>
+          </a:p>
+        </p:txBody>
+      </p:sp>
+      <p:sp>
+        <p:nvSpPr>
+          <p:cNvPr id="3" name="Content Placeholder 2">
+            <a:extLst>
+              <a:ext uri="{FF2B5EF4-FFF2-40B4-BE49-F238E27FC236}">
+                <a16:creationId xmlns:a16="http://schemas.microsoft.com/office/drawing/2014/main" id="{C025FCF3-57C7-4DCB-8CE3-95BC593B4E8E}"/>
+              </a:ext>
+            </a:extLst>
+          </p:cNvPr>
+          <p:cNvSpPr>
+            <a:spLocks noGrp="1"/>
+          </p:cNvSpPr>
+          <p:nvPr>
+            <p:ph idx="1"/>
+          </p:nvPr>
+        </p:nvSpPr>
+        <p:spPr/>
+        <p:txBody>
+          <a:bodyPr/>
+          <a:lstStyle/>
+          <a:p>
+            <a:r>
+              <a:rPr lang="en-US" dirty="0"/>
+              <a:t>Limitation:</a:t>
+            </a:r>
+          </a:p>
+          <a:p>
+            <a:pPr lvl="1"/>
+            <a:r>
+              <a:rPr lang="en-US" dirty="0"/>
+              <a:t>Accuracy on motion detection</a:t>
+            </a:r>
+          </a:p>
+          <a:p>
+            <a:pPr lvl="1"/>
+            <a:r>
+              <a:rPr lang="en-US" dirty="0"/>
+              <a:t>Hard to decide a proper trigger frequency</a:t>
+            </a:r>
+          </a:p>
+          <a:p>
+            <a:pPr lvl="1"/>
+            <a:r>
+              <a:rPr lang="en-US" dirty="0"/>
+              <a:t>Audio connection – No headphone jack on RPi Zero, need to seek a budget friendly way to play sound</a:t>
+            </a:r>
+          </a:p>
+          <a:p>
+            <a:pPr lvl="1"/>
+            <a:endParaRPr lang="en-US" dirty="0"/>
+          </a:p>
+          <a:p>
+            <a:r>
+              <a:rPr lang="en-US" dirty="0"/>
+              <a:t>Future Work:</a:t>
+            </a:r>
+          </a:p>
+          <a:p>
+            <a:pPr lvl="1"/>
+            <a:r>
+              <a:rPr lang="en-US" dirty="0"/>
+              <a:t>Automatically start &amp; run on each re/boot</a:t>
+            </a:r>
+          </a:p>
+          <a:p>
+            <a:pPr lvl="1"/>
+            <a:r>
+              <a:rPr lang="en-US" dirty="0"/>
+              <a:t>A front-end website for checking status</a:t>
+            </a:r>
+          </a:p>
+          <a:p>
+            <a:pPr lvl="1"/>
+            <a:r>
+              <a:rPr lang="en-US" dirty="0"/>
+              <a:t>More accurate object detection</a:t>
+            </a:r>
+          </a:p>
+        </p:txBody>
+      </p:sp>
+    </p:spTree>
+    <p:extLst>
+      <p:ext uri="{BB962C8B-B14F-4D97-AF65-F5344CB8AC3E}">
+        <p14:creationId xmlns:p14="http://schemas.microsoft.com/office/powerpoint/2010/main" val="2912744063"/>
+      </p:ext>
+    </p:extLst>
+  </p:cSld>
+  <p:clrMapOvr>
+    <a:masterClrMapping/>
+  </p:clrMapOvr>
+</p:sld>
+</file>
+
+<file path=ppt/slides/slide12.xml><?xml version="1.0" encoding="utf-8"?>
+<p:sld xmlns:a="http://schemas.openxmlformats.org/drawingml/2006/main" xmlns:r="http://schemas.openxmlformats.org/officeDocument/2006/relationships" xmlns:p="http://schemas.openxmlformats.org/presentationml/2006/main">
+  <p:cSld>
+    <p:spTree>
+      <p:nvGrpSpPr>
+        <p:cNvPr id="1" name=""/>
+        <p:cNvGrpSpPr/>
+        <p:nvPr/>
+      </p:nvGrpSpPr>
+      <p:grpSpPr>
+        <a:xfrm>
+          <a:off x="0" y="0"/>
+          <a:ext cx="0" cy="0"/>
+          <a:chOff x="0" y="0"/>
+          <a:chExt cx="0" cy="0"/>
+        </a:xfrm>
+      </p:grpSpPr>
+      <p:sp>
+        <p:nvSpPr>
+          <p:cNvPr id="2" name="Title 1">
+            <a:extLst>
+              <a:ext uri="{FF2B5EF4-FFF2-40B4-BE49-F238E27FC236}">
+                <a16:creationId xmlns:a16="http://schemas.microsoft.com/office/drawing/2014/main" id="{5975E60C-BD80-4468-8979-71C8D031A162}"/>
+              </a:ext>
+            </a:extLst>
+          </p:cNvPr>
+          <p:cNvSpPr>
+            <a:spLocks noGrp="1"/>
+          </p:cNvSpPr>
+          <p:nvPr>
+            <p:ph type="ctrTitle"/>
+          </p:nvPr>
+        </p:nvSpPr>
+        <p:spPr>
+          <a:xfrm>
+            <a:off x="1523999" y="1122363"/>
+            <a:ext cx="9350829" cy="4701494"/>
+          </a:xfrm>
+        </p:spPr>
+        <p:txBody>
+          <a:bodyPr>
+            <a:normAutofit/>
+          </a:bodyPr>
+          <a:lstStyle/>
+          <a:p>
+            <a:r>
+              <a:rPr lang="en-US" dirty="0"/>
+              <a:t>Thank you!</a:t>
+            </a:r>
+            <a:br>
+              <a:rPr lang="en-US" dirty="0"/>
+            </a:br>
+            <a:br>
+              <a:rPr lang="en-US" dirty="0"/>
+            </a:br>
+            <a:r>
+              <a:rPr lang="en-US" dirty="0"/>
+              <a:t>Questions?</a:t>
+            </a:r>
+            <a:br>
+              <a:rPr lang="en-US" dirty="0"/>
+            </a:br>
+            <a:endParaRPr lang="en-US" dirty="0"/>
+          </a:p>
+        </p:txBody>
+      </p:sp>
+    </p:spTree>
+    <p:extLst>
+      <p:ext uri="{BB962C8B-B14F-4D97-AF65-F5344CB8AC3E}">
+        <p14:creationId xmlns:p14="http://schemas.microsoft.com/office/powerpoint/2010/main" val="4228325829"/>
+      </p:ext>
+    </p:extLst>
+  </p:cSld>
+  <p:clrMapOvr>
+    <a:masterClrMapping/>
+  </p:clrMapOvr>
+</p:sld>
+</file>
+
+<file path=ppt/slides/slide13.xml><?xml version="1.0" encoding="utf-8"?>
+<p:sld xmlns:a="http://schemas.openxmlformats.org/drawingml/2006/main" xmlns:r="http://schemas.openxmlformats.org/officeDocument/2006/relationships" xmlns:p="http://schemas.openxmlformats.org/presentationml/2006/main">
+  <p:cSld>
+    <p:spTree>
+      <p:nvGrpSpPr>
+        <p:cNvPr id="1" name=""/>
+        <p:cNvGrpSpPr/>
+        <p:nvPr/>
+      </p:nvGrpSpPr>
+      <p:grpSpPr>
+        <a:xfrm>
+          <a:off x="0" y="0"/>
+          <a:ext cx="0" cy="0"/>
+          <a:chOff x="0" y="0"/>
+          <a:chExt cx="0" cy="0"/>
+        </a:xfrm>
+      </p:grpSpPr>
+      <p:sp>
+        <p:nvSpPr>
+          <p:cNvPr id="2" name="Title 1">
+            <a:extLst>
+              <a:ext uri="{FF2B5EF4-FFF2-40B4-BE49-F238E27FC236}">
                 <a16:creationId xmlns:a16="http://schemas.microsoft.com/office/drawing/2014/main" id="{C2FED7BA-AF5D-4171-84FD-4A97CBB82E7F}"/>
               </a:ext>
             </a:extLst>
@@ -3259,7 +3477,7 @@
           <a:bodyPr/>
           <a:lstStyle/>
           <a:p>
-            <a:endParaRPr lang="en-US"/>
+            <a:endParaRPr lang="en-US" dirty="0"/>
           </a:p>
         </p:txBody>
       </p:sp>
@@ -3284,86 +3502,9 @@
           <a:bodyPr/>
           <a:lstStyle/>
           <a:p>
-            <a:pPr algn="l">
-              <a:buFont typeface="Arial" panose="020B0604020202020204" pitchFamily="34" charset="0"/>
-              <a:buChar char="•"/>
+            <a:pPr marL="0" indent="0">
+              <a:buNone/>
             </a:pPr>
-            <a:r>
-              <a:rPr lang="en-US" b="0" i="0" dirty="0">
-                <a:solidFill>
-                  <a:srgbClr val="2D3B45"/>
-                </a:solidFill>
-                <a:effectLst/>
-                <a:latin typeface="Lato Extended"/>
-              </a:rPr>
-              <a:t>The Problem</a:t>
-            </a:r>
-          </a:p>
-          <a:p>
-            <a:pPr algn="l">
-              <a:buFont typeface="Arial" panose="020B0604020202020204" pitchFamily="34" charset="0"/>
-              <a:buChar char="•"/>
-            </a:pPr>
-            <a:r>
-              <a:rPr lang="en-US" b="0" i="0" dirty="0">
-                <a:solidFill>
-                  <a:srgbClr val="2D3B45"/>
-                </a:solidFill>
-                <a:effectLst/>
-                <a:latin typeface="Lato Extended"/>
-              </a:rPr>
-              <a:t>Proposed Solution(s)</a:t>
-            </a:r>
-          </a:p>
-          <a:p>
-            <a:pPr algn="l">
-              <a:buFont typeface="Arial" panose="020B0604020202020204" pitchFamily="34" charset="0"/>
-              <a:buChar char="•"/>
-            </a:pPr>
-            <a:r>
-              <a:rPr lang="en-US" b="0" i="0" dirty="0">
-                <a:solidFill>
-                  <a:srgbClr val="2D3B45"/>
-                </a:solidFill>
-                <a:effectLst/>
-                <a:latin typeface="Lato Extended"/>
-              </a:rPr>
-              <a:t>Platform of choice and equipment for creating the solution</a:t>
-            </a:r>
-          </a:p>
-          <a:p>
-            <a:pPr algn="l">
-              <a:buFont typeface="Arial" panose="020B0604020202020204" pitchFamily="34" charset="0"/>
-              <a:buChar char="•"/>
-            </a:pPr>
-            <a:r>
-              <a:rPr lang="en-US" b="0" i="0" dirty="0">
-                <a:solidFill>
-                  <a:srgbClr val="2D3B45"/>
-                </a:solidFill>
-                <a:effectLst/>
-                <a:latin typeface="Lato Extended"/>
-              </a:rPr>
-              <a:t>Milestones</a:t>
-            </a:r>
-          </a:p>
-          <a:p>
-            <a:pPr algn="l">
-              <a:buFont typeface="Arial" panose="020B0604020202020204" pitchFamily="34" charset="0"/>
-              <a:buChar char="•"/>
-            </a:pPr>
-            <a:r>
-              <a:rPr lang="en-US" b="0" i="0" dirty="0">
-                <a:solidFill>
-                  <a:srgbClr val="2D3B45"/>
-                </a:solidFill>
-                <a:effectLst/>
-                <a:latin typeface="Lato Extended"/>
-              </a:rPr>
-              <a:t>Timeline</a:t>
-            </a:r>
-          </a:p>
-          <a:p>
             <a:endParaRPr lang="en-US" dirty="0"/>
           </a:p>
         </p:txBody>
@@ -3421,11 +3562,7 @@
           <a:p>
             <a:r>
               <a:rPr lang="en-US" dirty="0"/>
-              <a:t>Problem </a:t>
-            </a:r>
-            <a:r>
-              <a:rPr lang="en-US"/>
-              <a:t>Discripton</a:t>
+              <a:t>Problem Description</a:t>
             </a:r>
           </a:p>
         </p:txBody>
@@ -3451,7 +3588,48 @@
           <a:bodyPr/>
           <a:lstStyle/>
           <a:p>
-            <a:endParaRPr lang="en-US"/>
+            <a:r>
+              <a:rPr lang="en-US" dirty="0"/>
+              <a:t>I have a cat. </a:t>
+            </a:r>
+          </a:p>
+          <a:p>
+            <a:r>
+              <a:rPr lang="en-US" dirty="0"/>
+              <a:t>There are certain areas in the house that I do not want him to </a:t>
+            </a:r>
+            <a:r>
+              <a:rPr lang="en-US" altLang="zh-CN" dirty="0"/>
+              <a:t>pass</a:t>
+            </a:r>
+            <a:r>
+              <a:rPr lang="en-US" dirty="0"/>
+              <a:t>.</a:t>
+            </a:r>
+          </a:p>
+          <a:p>
+            <a:r>
+              <a:rPr lang="en-US" dirty="0"/>
+              <a:t>Like the area that I just sprayed ant killer.</a:t>
+            </a:r>
+          </a:p>
+          <a:p>
+            <a:r>
+              <a:rPr lang="en-US" dirty="0"/>
+              <a:t>Pet gates are expensive and sometimes don’t work in open area </a:t>
+            </a:r>
+          </a:p>
+          <a:p>
+            <a:r>
+              <a:rPr lang="en-US" dirty="0"/>
+              <a:t>And my cat can jump over them.</a:t>
+            </a:r>
+          </a:p>
+          <a:p>
+            <a:r>
+              <a:rPr lang="en-US" dirty="0"/>
+              <a:t>I need something budget friendly and can stop my cat.</a:t>
+            </a:r>
           </a:p>
         </p:txBody>
       </p:sp>
@@ -3602,6 +3780,116 @@
           <p:cNvPr id="2" name="Title 1">
             <a:extLst>
               <a:ext uri="{FF2B5EF4-FFF2-40B4-BE49-F238E27FC236}">
+                <a16:creationId xmlns:a16="http://schemas.microsoft.com/office/drawing/2014/main" id="{1064F867-AB5D-45A6-8C7A-7E80A8BFE522}"/>
+              </a:ext>
+            </a:extLst>
+          </p:cNvPr>
+          <p:cNvSpPr>
+            <a:spLocks noGrp="1"/>
+          </p:cNvSpPr>
+          <p:nvPr>
+            <p:ph type="title"/>
+          </p:nvPr>
+        </p:nvSpPr>
+        <p:spPr/>
+        <p:txBody>
+          <a:bodyPr/>
+          <a:lstStyle/>
+          <a:p>
+            <a:r>
+              <a:rPr lang="en-US" dirty="0"/>
+              <a:t>Proposed Solution</a:t>
+            </a:r>
+          </a:p>
+        </p:txBody>
+      </p:sp>
+      <p:sp>
+        <p:nvSpPr>
+          <p:cNvPr id="3" name="Content Placeholder 2">
+            <a:extLst>
+              <a:ext uri="{FF2B5EF4-FFF2-40B4-BE49-F238E27FC236}">
+                <a16:creationId xmlns:a16="http://schemas.microsoft.com/office/drawing/2014/main" id="{AAC9F8DA-B77E-4B5F-AF96-A1640A0B782D}"/>
+              </a:ext>
+            </a:extLst>
+          </p:cNvPr>
+          <p:cNvSpPr>
+            <a:spLocks noGrp="1"/>
+          </p:cNvSpPr>
+          <p:nvPr>
+            <p:ph idx="1"/>
+          </p:nvPr>
+        </p:nvSpPr>
+        <p:spPr/>
+        <p:txBody>
+          <a:bodyPr/>
+          <a:lstStyle/>
+          <a:p>
+            <a:r>
+              <a:rPr lang="en-US" dirty="0"/>
+              <a:t>Utilizing PIR motion sensors to track movements</a:t>
+            </a:r>
+          </a:p>
+          <a:p>
+            <a:r>
+              <a:rPr lang="en-US" dirty="0"/>
+              <a:t>Dual sensor to differentiate movements of cat from human</a:t>
+            </a:r>
+          </a:p>
+          <a:p>
+            <a:r>
+              <a:rPr lang="en-US" dirty="0"/>
+              <a:t>Store all captured movements into database</a:t>
+            </a:r>
+          </a:p>
+          <a:p>
+            <a:r>
+              <a:rPr lang="en-US" dirty="0"/>
+              <a:t>View &amp; track each recorded data</a:t>
+            </a:r>
+          </a:p>
+          <a:p>
+            <a:r>
+              <a:rPr lang="en-US" dirty="0"/>
+              <a:t>Sound an alarm when cat detected</a:t>
+            </a:r>
+          </a:p>
+        </p:txBody>
+      </p:sp>
+    </p:spTree>
+    <p:extLst>
+      <p:ext uri="{BB962C8B-B14F-4D97-AF65-F5344CB8AC3E}">
+        <p14:creationId xmlns:p14="http://schemas.microsoft.com/office/powerpoint/2010/main" val="2525927528"/>
+      </p:ext>
+    </p:extLst>
+  </p:cSld>
+  <p:clrMapOvr>
+    <a:masterClrMapping/>
+  </p:clrMapOvr>
+</p:sld>
+</file>
+
+<file path=ppt/slides/slide5.xml><?xml version="1.0" encoding="utf-8"?>
+<p:sld xmlns:a="http://schemas.openxmlformats.org/drawingml/2006/main" xmlns:r="http://schemas.openxmlformats.org/officeDocument/2006/relationships" xmlns:p="http://schemas.openxmlformats.org/presentationml/2006/main">
+  <p:cSld>
+    <p:spTree>
+      <p:nvGrpSpPr>
+        <p:cNvPr id="1" name=""/>
+        <p:cNvGrpSpPr/>
+        <p:nvPr/>
+      </p:nvGrpSpPr>
+      <p:grpSpPr>
+        <a:xfrm>
+          <a:off x="0" y="0"/>
+          <a:ext cx="0" cy="0"/>
+          <a:chOff x="0" y="0"/>
+          <a:chExt cx="0" cy="0"/>
+        </a:xfrm>
+      </p:grpSpPr>
+      <p:sp>
+        <p:nvSpPr>
+          <p:cNvPr id="2" name="Title 1">
+            <a:extLst>
+              <a:ext uri="{FF2B5EF4-FFF2-40B4-BE49-F238E27FC236}">
                 <a16:creationId xmlns:a16="http://schemas.microsoft.com/office/drawing/2014/main" id="{9608B80A-987F-4359-BFF6-2E630861C776}"/>
               </a:ext>
             </a:extLst>
@@ -3655,15 +3943,7 @@
           <a:p>
             <a:r>
               <a:rPr lang="en-US" sz="2000" dirty="0"/>
-              <a:t>1 </a:t>
-            </a:r>
-            <a:r>
-              <a:rPr lang="en-US" sz="2000" dirty="0" err="1"/>
-              <a:t>Rpi</a:t>
-            </a:r>
-            <a:r>
-              <a:rPr lang="en-US" sz="2000" dirty="0"/>
-              <a:t> Zero </a:t>
+              <a:t>One RPi Zero W</a:t>
             </a:r>
           </a:p>
           <a:p>
@@ -3834,346 +4114,6 @@
     <p:extLst>
       <p:ext uri="{BB962C8B-B14F-4D97-AF65-F5344CB8AC3E}">
         <p14:creationId xmlns:p14="http://schemas.microsoft.com/office/powerpoint/2010/main" val="206645893"/>
-      </p:ext>
-    </p:extLst>
-  </p:cSld>
-  <p:clrMapOvr>
-    <a:masterClrMapping/>
-  </p:clrMapOvr>
-</p:sld>
-</file>
-
-<file path=ppt/slides/slide5.xml><?xml version="1.0" encoding="utf-8"?>
-<p:sld xmlns:a="http://schemas.openxmlformats.org/drawingml/2006/main" xmlns:r="http://schemas.openxmlformats.org/officeDocument/2006/relationships" xmlns:p="http://schemas.openxmlformats.org/presentationml/2006/main">
-  <p:cSld>
-    <p:spTree>
-      <p:nvGrpSpPr>
-        <p:cNvPr id="1" name=""/>
-        <p:cNvGrpSpPr/>
-        <p:nvPr/>
-      </p:nvGrpSpPr>
-      <p:grpSpPr>
-        <a:xfrm>
-          <a:off x="0" y="0"/>
-          <a:ext cx="0" cy="0"/>
-          <a:chOff x="0" y="0"/>
-          <a:chExt cx="0" cy="0"/>
-        </a:xfrm>
-      </p:grpSpPr>
-      <p:sp>
-        <p:nvSpPr>
-          <p:cNvPr id="2" name="Title 1">
-            <a:extLst>
-              <a:ext uri="{FF2B5EF4-FFF2-40B4-BE49-F238E27FC236}">
-                <a16:creationId xmlns:a16="http://schemas.microsoft.com/office/drawing/2014/main" id="{C2FED7BA-AF5D-4171-84FD-4A97CBB82E7F}"/>
-              </a:ext>
-            </a:extLst>
-          </p:cNvPr>
-          <p:cNvSpPr>
-            <a:spLocks noGrp="1"/>
-          </p:cNvSpPr>
-          <p:nvPr>
-            <p:ph type="title"/>
-          </p:nvPr>
-        </p:nvSpPr>
-        <p:spPr/>
-        <p:txBody>
-          <a:bodyPr/>
-          <a:lstStyle/>
-          <a:p>
-            <a:r>
-              <a:rPr lang="en-US" dirty="0"/>
-              <a:t>Changes &amp; Challenges</a:t>
-            </a:r>
-          </a:p>
-        </p:txBody>
-      </p:sp>
-      <p:sp>
-        <p:nvSpPr>
-          <p:cNvPr id="3" name="Content Placeholder 2">
-            <a:extLst>
-              <a:ext uri="{FF2B5EF4-FFF2-40B4-BE49-F238E27FC236}">
-                <a16:creationId xmlns:a16="http://schemas.microsoft.com/office/drawing/2014/main" id="{AB7F7EE8-3E79-42B7-8551-31560FEA0048}"/>
-              </a:ext>
-            </a:extLst>
-          </p:cNvPr>
-          <p:cNvSpPr>
-            <a:spLocks noGrp="1"/>
-          </p:cNvSpPr>
-          <p:nvPr>
-            <p:ph idx="1"/>
-          </p:nvPr>
-        </p:nvSpPr>
-        <p:spPr>
-          <a:xfrm>
-            <a:off x="838200" y="1825625"/>
-            <a:ext cx="9085976" cy="4885568"/>
-          </a:xfrm>
-        </p:spPr>
-        <p:txBody>
-          <a:bodyPr>
-            <a:normAutofit/>
-          </a:bodyPr>
-          <a:lstStyle/>
-          <a:p>
-            <a:pPr algn="l">
-              <a:buFont typeface="Arial" panose="020B0604020202020204" pitchFamily="34" charset="0"/>
-              <a:buChar char="•"/>
-            </a:pPr>
-            <a:r>
-              <a:rPr lang="en-US" sz="2400" b="0" i="0" dirty="0">
-                <a:solidFill>
-                  <a:schemeClr val="tx1">
-                    <a:lumMod val="85000"/>
-                  </a:schemeClr>
-                </a:solidFill>
-                <a:effectLst/>
-                <a:latin typeface="Lato Extended"/>
-              </a:rPr>
-              <a:t>Use 2 PIR sensors instead of 1</a:t>
-            </a:r>
-          </a:p>
-          <a:p>
-            <a:pPr lvl="1"/>
-            <a:r>
-              <a:rPr lang="en-US" sz="2000" dirty="0">
-                <a:solidFill>
-                  <a:schemeClr val="tx1">
-                    <a:lumMod val="85000"/>
-                  </a:schemeClr>
-                </a:solidFill>
-                <a:latin typeface="Lato Extended"/>
-              </a:rPr>
-              <a:t>Advantage: 1 PIR cannot differentiate cat from human passing through</a:t>
-            </a:r>
-          </a:p>
-          <a:p>
-            <a:pPr lvl="1"/>
-            <a:r>
-              <a:rPr lang="en-US" sz="2000" dirty="0">
-                <a:solidFill>
-                  <a:schemeClr val="tx1">
-                    <a:lumMod val="85000"/>
-                  </a:schemeClr>
-                </a:solidFill>
-                <a:latin typeface="Lato Extended"/>
-              </a:rPr>
-              <a:t>Cat can only trigger the sensor placed near ground</a:t>
-            </a:r>
-          </a:p>
-          <a:p>
-            <a:pPr lvl="1"/>
-            <a:r>
-              <a:rPr lang="en-US" sz="2000" dirty="0">
-                <a:solidFill>
-                  <a:schemeClr val="tx1">
-                    <a:lumMod val="85000"/>
-                  </a:schemeClr>
-                </a:solidFill>
-                <a:latin typeface="Lato Extended"/>
-              </a:rPr>
-              <a:t>Human will trigger both sensors</a:t>
-            </a:r>
-          </a:p>
-          <a:p>
-            <a:pPr algn="l">
-              <a:buFont typeface="Arial" panose="020B0604020202020204" pitchFamily="34" charset="0"/>
-              <a:buChar char="•"/>
-            </a:pPr>
-            <a:r>
-              <a:rPr lang="en-US" sz="2400" b="0" i="0" dirty="0">
-                <a:solidFill>
-                  <a:schemeClr val="tx1">
-                    <a:lumMod val="85000"/>
-                  </a:schemeClr>
-                </a:solidFill>
-                <a:effectLst/>
-                <a:latin typeface="Lato Extended"/>
-              </a:rPr>
-              <a:t>Challenge:</a:t>
-            </a:r>
-          </a:p>
-          <a:p>
-            <a:pPr lvl="1"/>
-            <a:r>
-              <a:rPr lang="en-US" sz="2000" dirty="0">
-                <a:solidFill>
-                  <a:schemeClr val="tx1">
-                    <a:lumMod val="85000"/>
-                  </a:schemeClr>
-                </a:solidFill>
-                <a:latin typeface="Lato Extended"/>
-              </a:rPr>
-              <a:t>2 PIR sensor do not necessarily being triggered simultaneously.</a:t>
-            </a:r>
-            <a:endParaRPr lang="en-US" sz="2000" b="0" i="0" dirty="0">
-              <a:solidFill>
-                <a:schemeClr val="tx1">
-                  <a:lumMod val="85000"/>
-                </a:schemeClr>
-              </a:solidFill>
-              <a:effectLst/>
-              <a:latin typeface="Lato Extended"/>
-            </a:endParaRPr>
-          </a:p>
-          <a:p>
-            <a:pPr algn="l">
-              <a:buFont typeface="Arial" panose="020B0604020202020204" pitchFamily="34" charset="0"/>
-              <a:buChar char="•"/>
-            </a:pPr>
-            <a:r>
-              <a:rPr lang="en-US" sz="2400" b="0" i="0" dirty="0">
-                <a:solidFill>
-                  <a:schemeClr val="tx1">
-                    <a:lumMod val="85000"/>
-                  </a:schemeClr>
-                </a:solidFill>
-                <a:effectLst/>
-                <a:latin typeface="Lato Extended"/>
-              </a:rPr>
-              <a:t>Proposed Solution:</a:t>
-            </a:r>
-          </a:p>
-          <a:p>
-            <a:pPr lvl="1"/>
-            <a:r>
-              <a:rPr lang="en-US" sz="2000" b="0" i="0" dirty="0">
-                <a:solidFill>
-                  <a:schemeClr val="tx1">
-                    <a:lumMod val="85000"/>
-                  </a:schemeClr>
-                </a:solidFill>
-                <a:effectLst/>
-                <a:latin typeface="Lato Extended"/>
-              </a:rPr>
-              <a:t>Async functions / Callback functions</a:t>
-            </a:r>
-          </a:p>
-          <a:p>
-            <a:pPr algn="l">
-              <a:buFont typeface="Arial" panose="020B0604020202020204" pitchFamily="34" charset="0"/>
-              <a:buChar char="•"/>
-            </a:pPr>
-            <a:r>
-              <a:rPr lang="en-US" sz="2400" b="0" i="0" dirty="0">
-                <a:solidFill>
-                  <a:schemeClr val="tx1">
-                    <a:lumMod val="85000"/>
-                  </a:schemeClr>
-                </a:solidFill>
-                <a:effectLst/>
-                <a:latin typeface="Lato Extended"/>
-              </a:rPr>
-              <a:t>Milestones:</a:t>
-            </a:r>
-          </a:p>
-          <a:p>
-            <a:pPr lvl="1"/>
-            <a:r>
-              <a:rPr lang="en-US" sz="2000" b="0" i="0" dirty="0">
-                <a:solidFill>
-                  <a:schemeClr val="tx1">
-                    <a:lumMod val="85000"/>
-                  </a:schemeClr>
-                </a:solidFill>
-                <a:effectLst/>
-                <a:latin typeface="Lato Extended"/>
-              </a:rPr>
-              <a:t>Tested </a:t>
-            </a:r>
-            <a:r>
-              <a:rPr lang="en-US" sz="2000" b="0" i="0" dirty="0" err="1">
-                <a:solidFill>
-                  <a:schemeClr val="tx1">
-                    <a:lumMod val="85000"/>
-                  </a:schemeClr>
-                </a:solidFill>
-                <a:effectLst/>
-                <a:latin typeface="Lato Extended"/>
-              </a:rPr>
-              <a:t>GPIO.add_event_detect</a:t>
-            </a:r>
-            <a:r>
-              <a:rPr lang="en-US" sz="2000" b="0" i="0" dirty="0">
-                <a:solidFill>
-                  <a:schemeClr val="tx1">
-                    <a:lumMod val="85000"/>
-                  </a:schemeClr>
-                </a:solidFill>
-                <a:effectLst/>
-                <a:latin typeface="Lato Extended"/>
-              </a:rPr>
-              <a:t>, timeouts, etc..</a:t>
-            </a:r>
-          </a:p>
-          <a:p>
-            <a:pPr lvl="1"/>
-            <a:r>
-              <a:rPr lang="en-US" sz="2000" b="0" i="0" dirty="0">
-                <a:solidFill>
-                  <a:schemeClr val="tx1">
-                    <a:lumMod val="85000"/>
-                  </a:schemeClr>
-                </a:solidFill>
-                <a:effectLst/>
-                <a:latin typeface="Lato Extended"/>
-              </a:rPr>
-              <a:t>Python wait/async </a:t>
-            </a:r>
-            <a:r>
-              <a:rPr lang="en-US" sz="2000" b="0" i="0" dirty="0" err="1">
-                <a:solidFill>
-                  <a:schemeClr val="tx1">
-                    <a:lumMod val="85000"/>
-                  </a:schemeClr>
-                </a:solidFill>
-                <a:effectLst/>
-                <a:latin typeface="Lato Extended"/>
-              </a:rPr>
-              <a:t>functons</a:t>
-            </a:r>
-            <a:endParaRPr lang="en-US" sz="2000" b="0" i="0" dirty="0">
-              <a:solidFill>
-                <a:schemeClr val="tx1">
-                  <a:lumMod val="85000"/>
-                </a:schemeClr>
-              </a:solidFill>
-              <a:effectLst/>
-              <a:latin typeface="Lato Extended"/>
-            </a:endParaRPr>
-          </a:p>
-          <a:p>
-            <a:pPr lvl="1"/>
-            <a:r>
-              <a:rPr lang="en-US" sz="2000" dirty="0">
-                <a:solidFill>
-                  <a:schemeClr val="tx1">
-                    <a:lumMod val="85000"/>
-                  </a:schemeClr>
-                </a:solidFill>
-                <a:latin typeface="Lato Extended"/>
-              </a:rPr>
-              <a:t>Continue testing</a:t>
-            </a:r>
-            <a:endParaRPr lang="en-US" sz="2000" b="0" i="0" dirty="0">
-              <a:solidFill>
-                <a:schemeClr val="tx1">
-                  <a:lumMod val="85000"/>
-                </a:schemeClr>
-              </a:solidFill>
-              <a:effectLst/>
-              <a:latin typeface="Lato Extended"/>
-            </a:endParaRPr>
-          </a:p>
-          <a:p>
-            <a:endParaRPr lang="en-US" sz="2400" dirty="0"/>
-          </a:p>
-        </p:txBody>
-      </p:sp>
-    </p:spTree>
-    <p:extLst>
-      <p:ext uri="{BB962C8B-B14F-4D97-AF65-F5344CB8AC3E}">
-        <p14:creationId xmlns:p14="http://schemas.microsoft.com/office/powerpoint/2010/main" val="1367801407"/>
       </p:ext>
     </p:extLst>
   </p:cSld>
@@ -4696,7 +4636,7 @@
           <p:cNvPr id="2" name="Title 1">
             <a:extLst>
               <a:ext uri="{FF2B5EF4-FFF2-40B4-BE49-F238E27FC236}">
-                <a16:creationId xmlns:a16="http://schemas.microsoft.com/office/drawing/2014/main" id="{0632F8DB-8B94-4260-9E4E-5CF1EF725CE5}"/>
+                <a16:creationId xmlns:a16="http://schemas.microsoft.com/office/drawing/2014/main" id="{C2FED7BA-AF5D-4171-84FD-4A97CBB82E7F}"/>
               </a:ext>
             </a:extLst>
           </p:cNvPr>
@@ -4707,19 +4647,14 @@
             <p:ph type="title"/>
           </p:nvPr>
         </p:nvSpPr>
-        <p:spPr>
-          <a:xfrm>
-            <a:off x="838199" y="365126"/>
-            <a:ext cx="7363407" cy="1155764"/>
-          </a:xfrm>
-        </p:spPr>
+        <p:spPr/>
         <p:txBody>
           <a:bodyPr/>
           <a:lstStyle/>
           <a:p>
             <a:r>
               <a:rPr lang="en-US" dirty="0"/>
-              <a:t>A Sample Email</a:t>
+              <a:t>Changes &amp; Challenges</a:t>
             </a:r>
           </a:p>
         </p:txBody>
@@ -4729,7 +4664,7 @@
           <p:cNvPr id="3" name="Content Placeholder 2">
             <a:extLst>
               <a:ext uri="{FF2B5EF4-FFF2-40B4-BE49-F238E27FC236}">
-                <a16:creationId xmlns:a16="http://schemas.microsoft.com/office/drawing/2014/main" id="{D235339B-EA88-421D-A526-A0DDA017C6AC}"/>
+                <a16:creationId xmlns:a16="http://schemas.microsoft.com/office/drawing/2014/main" id="{AB7F7EE8-3E79-42B7-8551-31560FEA0048}"/>
               </a:ext>
             </a:extLst>
           </p:cNvPr>
@@ -4743,51 +4678,322 @@
         <p:spPr>
           <a:xfrm>
             <a:off x="838200" y="1825625"/>
-            <a:ext cx="7363408" cy="4667250"/>
+            <a:ext cx="9085976" cy="4885568"/>
           </a:xfrm>
         </p:spPr>
         <p:txBody>
-          <a:bodyPr/>
-          <a:lstStyle/>
-          <a:p>
-            <a:endParaRPr lang="en-US" dirty="0"/>
-          </a:p>
-        </p:txBody>
-      </p:sp>
-      <p:pic>
-        <p:nvPicPr>
-          <p:cNvPr id="5" name="Picture 4">
-            <a:extLst>
-              <a:ext uri="{FF2B5EF4-FFF2-40B4-BE49-F238E27FC236}">
-                <a16:creationId xmlns:a16="http://schemas.microsoft.com/office/drawing/2014/main" id="{21ABA21F-019F-45D4-81E5-C21FBAEA42D3}"/>
-              </a:ext>
-            </a:extLst>
-          </p:cNvPr>
-          <p:cNvPicPr>
-            <a:picLocks noChangeAspect="1"/>
-          </p:cNvPicPr>
-          <p:nvPr/>
-        </p:nvPicPr>
-        <p:blipFill>
-          <a:blip r:embed="rId2"/>
-          <a:stretch>
-            <a:fillRect/>
-          </a:stretch>
-        </p:blipFill>
-        <p:spPr>
-          <a:xfrm>
-            <a:off x="8334818" y="197745"/>
-            <a:ext cx="3018982" cy="6462509"/>
-          </a:xfrm>
-          <a:prstGeom prst="rect">
-            <a:avLst/>
-          </a:prstGeom>
-        </p:spPr>
-      </p:pic>
+          <a:bodyPr>
+            <a:normAutofit/>
+          </a:bodyPr>
+          <a:lstStyle/>
+          <a:p>
+            <a:pPr algn="l">
+              <a:buFont typeface="Arial" panose="020B0604020202020204" pitchFamily="34" charset="0"/>
+              <a:buChar char="•"/>
+            </a:pPr>
+            <a:r>
+              <a:rPr lang="en-US" sz="2400" b="0" i="0" dirty="0">
+                <a:solidFill>
+                  <a:schemeClr val="tx1">
+                    <a:lumMod val="85000"/>
+                  </a:schemeClr>
+                </a:solidFill>
+                <a:effectLst/>
+                <a:latin typeface="Lato Extended"/>
+              </a:rPr>
+              <a:t>Use </a:t>
+            </a:r>
+            <a:r>
+              <a:rPr lang="en-US" sz="2400" dirty="0">
+                <a:solidFill>
+                  <a:schemeClr val="tx1">
+                    <a:lumMod val="85000"/>
+                  </a:schemeClr>
+                </a:solidFill>
+                <a:latin typeface="Lato Extended"/>
+              </a:rPr>
+              <a:t>two</a:t>
+            </a:r>
+            <a:r>
+              <a:rPr lang="en-US" sz="2400" b="0" i="0" dirty="0">
+                <a:solidFill>
+                  <a:schemeClr val="tx1">
+                    <a:lumMod val="85000"/>
+                  </a:schemeClr>
+                </a:solidFill>
+                <a:effectLst/>
+                <a:latin typeface="Lato Extended"/>
+              </a:rPr>
+              <a:t> PIR sensors instead of one</a:t>
+            </a:r>
+          </a:p>
+          <a:p>
+            <a:pPr lvl="1"/>
+            <a:r>
+              <a:rPr lang="en-US" sz="2000" dirty="0">
+                <a:solidFill>
+                  <a:schemeClr val="tx1">
+                    <a:lumMod val="85000"/>
+                  </a:schemeClr>
+                </a:solidFill>
+                <a:latin typeface="Lato Extended"/>
+              </a:rPr>
+              <a:t>Advantage: one PIR cannot differentiate cat from human passing through</a:t>
+            </a:r>
+          </a:p>
+          <a:p>
+            <a:pPr lvl="1"/>
+            <a:r>
+              <a:rPr lang="en-US" sz="2000" dirty="0">
+                <a:solidFill>
+                  <a:schemeClr val="tx1">
+                    <a:lumMod val="85000"/>
+                  </a:schemeClr>
+                </a:solidFill>
+                <a:latin typeface="Lato Extended"/>
+              </a:rPr>
+              <a:t>Cat can only trigger the sensor placed near ground</a:t>
+            </a:r>
+          </a:p>
+          <a:p>
+            <a:pPr lvl="1"/>
+            <a:r>
+              <a:rPr lang="en-US" sz="2000" dirty="0">
+                <a:solidFill>
+                  <a:schemeClr val="tx1">
+                    <a:lumMod val="85000"/>
+                  </a:schemeClr>
+                </a:solidFill>
+                <a:latin typeface="Lato Extended"/>
+              </a:rPr>
+              <a:t>Human will trigger both sensors</a:t>
+            </a:r>
+          </a:p>
+          <a:p>
+            <a:pPr algn="l">
+              <a:buFont typeface="Arial" panose="020B0604020202020204" pitchFamily="34" charset="0"/>
+              <a:buChar char="•"/>
+            </a:pPr>
+            <a:r>
+              <a:rPr lang="en-US" sz="2400" b="0" i="0" dirty="0">
+                <a:solidFill>
+                  <a:schemeClr val="tx1">
+                    <a:lumMod val="85000"/>
+                  </a:schemeClr>
+                </a:solidFill>
+                <a:effectLst/>
+                <a:latin typeface="Lato Extended"/>
+              </a:rPr>
+              <a:t>Challenge:</a:t>
+            </a:r>
+          </a:p>
+          <a:p>
+            <a:pPr lvl="1"/>
+            <a:r>
+              <a:rPr lang="en-US" sz="2000" dirty="0">
+                <a:solidFill>
+                  <a:schemeClr val="tx1">
+                    <a:lumMod val="85000"/>
+                  </a:schemeClr>
+                </a:solidFill>
+                <a:latin typeface="Lato Extended"/>
+              </a:rPr>
+              <a:t>Two PIR sensor do not necessarily being triggered simultaneously.</a:t>
+            </a:r>
+          </a:p>
+          <a:p>
+            <a:pPr lvl="1"/>
+            <a:r>
+              <a:rPr lang="en-US" sz="2000" b="0" i="0" dirty="0">
+                <a:solidFill>
+                  <a:schemeClr val="tx1">
+                    <a:lumMod val="85000"/>
+                  </a:schemeClr>
+                </a:solidFill>
+                <a:effectLst/>
+                <a:latin typeface="Lato Extended"/>
+              </a:rPr>
+              <a:t>Need to handle</a:t>
+            </a:r>
+            <a:r>
+              <a:rPr lang="en-US" sz="2000" dirty="0">
+                <a:solidFill>
+                  <a:schemeClr val="tx1">
+                    <a:lumMod val="85000"/>
+                  </a:schemeClr>
+                </a:solidFill>
+                <a:latin typeface="Lato Extended"/>
+              </a:rPr>
+              <a:t> 2 events triggered within a time frame</a:t>
+            </a:r>
+            <a:endParaRPr lang="en-US" sz="2000" b="0" i="0" dirty="0">
+              <a:solidFill>
+                <a:schemeClr val="tx1">
+                  <a:lumMod val="85000"/>
+                </a:schemeClr>
+              </a:solidFill>
+              <a:effectLst/>
+              <a:latin typeface="Lato Extended"/>
+            </a:endParaRPr>
+          </a:p>
+          <a:p>
+            <a:pPr algn="l">
+              <a:buFont typeface="Arial" panose="020B0604020202020204" pitchFamily="34" charset="0"/>
+              <a:buChar char="•"/>
+            </a:pPr>
+            <a:r>
+              <a:rPr lang="en-US" sz="2400" b="0" i="0" dirty="0">
+                <a:solidFill>
+                  <a:schemeClr val="tx1">
+                    <a:lumMod val="85000"/>
+                  </a:schemeClr>
+                </a:solidFill>
+                <a:effectLst/>
+                <a:latin typeface="Lato Extended"/>
+              </a:rPr>
+              <a:t>Proposed Solution:</a:t>
+            </a:r>
+          </a:p>
+          <a:p>
+            <a:pPr lvl="1"/>
+            <a:r>
+              <a:rPr lang="en-US" sz="2000" b="0" i="0" dirty="0">
+                <a:solidFill>
+                  <a:schemeClr val="tx1">
+                    <a:lumMod val="85000"/>
+                  </a:schemeClr>
+                </a:solidFill>
+                <a:effectLst/>
+                <a:latin typeface="Lato Extended"/>
+              </a:rPr>
+              <a:t>Async functions / Callback functions</a:t>
+            </a:r>
+          </a:p>
+          <a:p>
+            <a:pPr algn="l">
+              <a:buFont typeface="Arial" panose="020B0604020202020204" pitchFamily="34" charset="0"/>
+              <a:buChar char="•"/>
+            </a:pPr>
+            <a:r>
+              <a:rPr lang="en-US" sz="2400" b="0" i="0" dirty="0">
+                <a:solidFill>
+                  <a:schemeClr val="tx1">
+                    <a:lumMod val="85000"/>
+                  </a:schemeClr>
+                </a:solidFill>
+                <a:effectLst/>
+                <a:latin typeface="Lato Extended"/>
+              </a:rPr>
+              <a:t>Milestones:</a:t>
+            </a:r>
+          </a:p>
+          <a:p>
+            <a:pPr lvl="1"/>
+            <a:r>
+              <a:rPr lang="en-US" sz="2000" b="0" i="0" dirty="0">
+                <a:solidFill>
+                  <a:schemeClr val="tx1">
+                    <a:lumMod val="85000"/>
+                  </a:schemeClr>
+                </a:solidFill>
+                <a:effectLst/>
+                <a:latin typeface="Lato Extended"/>
+              </a:rPr>
+              <a:t>Tested </a:t>
+            </a:r>
+            <a:r>
+              <a:rPr lang="en-US" sz="2000" b="0" i="0" dirty="0" err="1">
+                <a:solidFill>
+                  <a:schemeClr val="tx1">
+                    <a:lumMod val="85000"/>
+                  </a:schemeClr>
+                </a:solidFill>
+                <a:effectLst/>
+                <a:latin typeface="Lato Extended"/>
+              </a:rPr>
+              <a:t>GPIO.add_event_detect</a:t>
+            </a:r>
+            <a:r>
+              <a:rPr lang="en-US" sz="2000" b="0" i="0" dirty="0">
+                <a:solidFill>
+                  <a:schemeClr val="tx1">
+                    <a:lumMod val="85000"/>
+                  </a:schemeClr>
+                </a:solidFill>
+                <a:effectLst/>
+                <a:latin typeface="Lato Extended"/>
+              </a:rPr>
+              <a:t>, timeouts, etc..</a:t>
+            </a:r>
+          </a:p>
+          <a:p>
+            <a:pPr lvl="1"/>
+            <a:r>
+              <a:rPr lang="en-US" sz="2000" b="0" i="0" dirty="0">
+                <a:solidFill>
+                  <a:schemeClr val="tx1">
+                    <a:lumMod val="85000"/>
+                  </a:schemeClr>
+                </a:solidFill>
+                <a:effectLst/>
+                <a:latin typeface="Lato Extended"/>
+              </a:rPr>
+              <a:t>Python wait/async </a:t>
+            </a:r>
+            <a:r>
+              <a:rPr lang="en-US" sz="2000" b="0" i="0" dirty="0" err="1">
+                <a:solidFill>
+                  <a:schemeClr val="tx1">
+                    <a:lumMod val="85000"/>
+                  </a:schemeClr>
+                </a:solidFill>
+                <a:effectLst/>
+                <a:latin typeface="Lato Extended"/>
+              </a:rPr>
+              <a:t>functons</a:t>
+            </a:r>
+            <a:endParaRPr lang="en-US" sz="2000" b="0" i="0" dirty="0">
+              <a:solidFill>
+                <a:schemeClr val="tx1">
+                  <a:lumMod val="85000"/>
+                </a:schemeClr>
+              </a:solidFill>
+              <a:effectLst/>
+              <a:latin typeface="Lato Extended"/>
+            </a:endParaRPr>
+          </a:p>
+          <a:p>
+            <a:pPr lvl="1"/>
+            <a:r>
+              <a:rPr lang="en-US" sz="2000" dirty="0">
+                <a:solidFill>
+                  <a:schemeClr val="tx1">
+                    <a:lumMod val="85000"/>
+                  </a:schemeClr>
+                </a:solidFill>
+                <a:latin typeface="Lato Extended"/>
+              </a:rPr>
+              <a:t>Continue testing</a:t>
+            </a:r>
+            <a:endParaRPr lang="en-US" sz="2000" b="0" i="0" dirty="0">
+              <a:solidFill>
+                <a:schemeClr val="tx1">
+                  <a:lumMod val="85000"/>
+                </a:schemeClr>
+              </a:solidFill>
+              <a:effectLst/>
+              <a:latin typeface="Lato Extended"/>
+            </a:endParaRPr>
+          </a:p>
+          <a:p>
+            <a:endParaRPr lang="en-US" sz="2400" dirty="0"/>
+          </a:p>
+        </p:txBody>
+      </p:sp>
     </p:spTree>
     <p:extLst>
       <p:ext uri="{BB962C8B-B14F-4D97-AF65-F5344CB8AC3E}">
-        <p14:creationId xmlns:p14="http://schemas.microsoft.com/office/powerpoint/2010/main" val="4290429151"/>
+        <p14:creationId xmlns:p14="http://schemas.microsoft.com/office/powerpoint/2010/main" val="1367801407"/>
       </p:ext>
     </p:extLst>
   </p:cSld>

</xml_diff>